<commit_message>
Andrew under the surface
</commit_message>
<xml_diff>
--- a/under-the-surface/andrew_elmore.pptx
+++ b/under-the-surface/andrew_elmore.pptx
@@ -115,7 +115,7 @@
   <pc:docChgLst>
     <pc:chgData name="Andrew Elmore" userId="cecc3eee-8a2f-4b66-be88-dcab40209726" providerId="ADAL" clId="{1E8EB737-964D-684E-B907-899B9D5A62E5}"/>
     <pc:docChg chg="undo custSel delSld modSld">
-      <pc:chgData name="Andrew Elmore" userId="cecc3eee-8a2f-4b66-be88-dcab40209726" providerId="ADAL" clId="{1E8EB737-964D-684E-B907-899B9D5A62E5}" dt="2023-06-13T15:33:40.042" v="1204" actId="20577"/>
+      <pc:chgData name="Andrew Elmore" userId="cecc3eee-8a2f-4b66-be88-dcab40209726" providerId="ADAL" clId="{1E8EB737-964D-684E-B907-899B9D5A62E5}" dt="2023-06-13T18:43:56.622" v="1507" actId="20577"/>
       <pc:docMkLst>
         <pc:docMk/>
       </pc:docMkLst>
@@ -157,13 +157,13 @@
         </pc:spChg>
       </pc:sldChg>
       <pc:sldChg chg="modSp mod">
-        <pc:chgData name="Andrew Elmore" userId="cecc3eee-8a2f-4b66-be88-dcab40209726" providerId="ADAL" clId="{1E8EB737-964D-684E-B907-899B9D5A62E5}" dt="2023-06-13T15:24:42.759" v="1116" actId="20577"/>
+        <pc:chgData name="Andrew Elmore" userId="cecc3eee-8a2f-4b66-be88-dcab40209726" providerId="ADAL" clId="{1E8EB737-964D-684E-B907-899B9D5A62E5}" dt="2023-06-13T18:43:56.622" v="1507" actId="20577"/>
         <pc:sldMkLst>
           <pc:docMk/>
           <pc:sldMk cId="3753485682" sldId="261"/>
         </pc:sldMkLst>
         <pc:spChg chg="mod">
-          <ac:chgData name="Andrew Elmore" userId="cecc3eee-8a2f-4b66-be88-dcab40209726" providerId="ADAL" clId="{1E8EB737-964D-684E-B907-899B9D5A62E5}" dt="2023-06-13T15:24:42.759" v="1116" actId="20577"/>
+          <ac:chgData name="Andrew Elmore" userId="cecc3eee-8a2f-4b66-be88-dcab40209726" providerId="ADAL" clId="{1E8EB737-964D-684E-B907-899B9D5A62E5}" dt="2023-06-13T18:37:50.304" v="1341" actId="313"/>
           <ac:spMkLst>
             <pc:docMk/>
             <pc:sldMk cId="3753485682" sldId="261"/>
@@ -171,7 +171,7 @@
           </ac:spMkLst>
         </pc:spChg>
         <pc:spChg chg="mod">
-          <ac:chgData name="Andrew Elmore" userId="cecc3eee-8a2f-4b66-be88-dcab40209726" providerId="ADAL" clId="{1E8EB737-964D-684E-B907-899B9D5A62E5}" dt="2023-06-13T14:56:15.892" v="996" actId="20577"/>
+          <ac:chgData name="Andrew Elmore" userId="cecc3eee-8a2f-4b66-be88-dcab40209726" providerId="ADAL" clId="{1E8EB737-964D-684E-B907-899B9D5A62E5}" dt="2023-06-13T18:43:56.622" v="1507" actId="20577"/>
           <ac:spMkLst>
             <pc:docMk/>
             <pc:sldMk cId="3753485682" sldId="261"/>
@@ -3845,7 +3845,7 @@
           <a:p>
             <a:r>
               <a:rPr lang="en-US" dirty="0"/>
-              <a:t>Haiku</a:t>
+              <a:t>Limerick</a:t>
             </a:r>
           </a:p>
         </p:txBody>
@@ -3868,7 +3868,9 @@
         </p:nvSpPr>
         <p:spPr/>
         <p:txBody>
-          <a:bodyPr/>
+          <a:bodyPr>
+            <a:normAutofit lnSpcReduction="10000"/>
+          </a:bodyPr>
           <a:lstStyle/>
           <a:p>
             <a:pPr marL="0" indent="0" algn="ctr">
@@ -3882,15 +3884,8 @@
             </a:pPr>
             <a:r>
               <a:rPr lang="en-US" dirty="0"/>
-              <a:t>More time pass, more sick </a:t>
-            </a:r>
-            <a:r>
-              <a:rPr lang="en-US" dirty="0">
-                <a:sym typeface="Wingdings" pitchFamily="2" charset="2"/>
-              </a:rPr>
-              <a:t></a:t>
-            </a:r>
-            <a:endParaRPr lang="en-US" dirty="0"/>
+              <a:t>There once was a woman who was ill</a:t>
+            </a:r>
           </a:p>
           <a:p>
             <a:pPr marL="0" indent="0" algn="ctr">
@@ -3898,8 +3893,21 @@
             </a:pPr>
             <a:r>
               <a:rPr lang="en-US" dirty="0"/>
-              <a:t>Can we stop sick before bad?</a:t>
-            </a:r>
+              <a:t>She kept getting worse </a:t>
+            </a:r>
+            <a:r>
+              <a:rPr lang="en-US" dirty="0" err="1"/>
+              <a:t>lil</a:t>
+            </a:r>
+            <a:r>
+              <a:rPr lang="en-US" dirty="0"/>
+              <a:t> by </a:t>
+            </a:r>
+            <a:r>
+              <a:rPr lang="en-US" dirty="0" err="1"/>
+              <a:t>lil</a:t>
+            </a:r>
+            <a:endParaRPr lang="en-US" dirty="0"/>
           </a:p>
           <a:p>
             <a:pPr marL="0" indent="0" algn="ctr">
@@ -3907,7 +3915,30 @@
             </a:pPr>
             <a:r>
               <a:rPr lang="en-US" dirty="0"/>
-              <a:t>I fucking hope so.</a:t>
+              <a:t>Someone figured out what </a:t>
+            </a:r>
+            <a:r>
+              <a:rPr lang="en-US"/>
+              <a:t>was wrong,</a:t>
+            </a:r>
+            <a:endParaRPr lang="en-US" dirty="0"/>
+          </a:p>
+          <a:p>
+            <a:pPr marL="0" indent="0" algn="ctr">
+              <a:buNone/>
+            </a:pPr>
+            <a:r>
+              <a:rPr lang="en-US" dirty="0"/>
+              <a:t>A treatment came along</a:t>
+            </a:r>
+          </a:p>
+          <a:p>
+            <a:pPr marL="0" indent="0" algn="ctr">
+              <a:buNone/>
+            </a:pPr>
+            <a:r>
+              <a:rPr lang="en-US" dirty="0"/>
+              <a:t>Now she can stop writing her will.</a:t>
             </a:r>
           </a:p>
           <a:p>

</xml_diff>